<commit_message>
Updated powerpoint - all results
</commit_message>
<xml_diff>
--- a/Presentation.pptx
+++ b/Presentation.pptx
@@ -5,7 +5,7 @@
     <p:sldMasterId id="2147483660" r:id="rId1"/>
   </p:sldMasterIdLst>
   <p:notesMasterIdLst>
-    <p:notesMasterId r:id="rId13"/>
+    <p:notesMasterId r:id="rId15"/>
   </p:notesMasterIdLst>
   <p:sldIdLst>
     <p:sldId id="256" r:id="rId2"/>
@@ -17,8 +17,10 @@
     <p:sldId id="267" r:id="rId8"/>
     <p:sldId id="266" r:id="rId9"/>
     <p:sldId id="269" r:id="rId10"/>
-    <p:sldId id="268" r:id="rId11"/>
-    <p:sldId id="262" r:id="rId12"/>
+    <p:sldId id="270" r:id="rId11"/>
+    <p:sldId id="271" r:id="rId12"/>
+    <p:sldId id="268" r:id="rId13"/>
+    <p:sldId id="262" r:id="rId14"/>
   </p:sldIdLst>
   <p:sldSz cx="9144000" cy="6858000" type="screen4x3"/>
   <p:notesSz cx="6858000" cy="9144000"/>
@@ -119,7 +121,7 @@
   </p:defaultTextStyle>
   <p:extLst>
     <p:ext uri="{EFAFB233-063F-42B5-8137-9DF3F51BA10A}">
-      <p15:sldGuideLst xmlns="" xmlns:p15="http://schemas.microsoft.com/office/powerpoint/2012/main">
+      <p15:sldGuideLst xmlns:p15="http://schemas.microsoft.com/office/powerpoint/2012/main" xmlns="">
         <p15:guide id="1" orient="horz" pos="2160">
           <p15:clr>
             <a:srgbClr val="A4A3A4"/>
@@ -647,7 +649,7 @@
     </p:spTree>
     <p:extLst>
       <p:ext uri="{BB962C8B-B14F-4D97-AF65-F5344CB8AC3E}">
-        <p14:creationId xmlns:p14="http://schemas.microsoft.com/office/powerpoint/2010/main" val="3169262235"/>
+        <p14:creationId xmlns:p14="http://schemas.microsoft.com/office/powerpoint/2010/main" val="741890155"/>
       </p:ext>
     </p:extLst>
   </p:cSld>
@@ -723,6 +725,174 @@
             <a:fld id="{261CDD63-AF9B-4BBE-BAEE-FE96D596103A}" type="slidenum">
               <a:rPr lang="nl-NL" smtClean="0"/>
               <a:t>11</a:t>
+            </a:fld>
+            <a:endParaRPr lang="nl-NL"/>
+          </a:p>
+        </p:txBody>
+      </p:sp>
+    </p:spTree>
+    <p:extLst>
+      <p:ext uri="{BB962C8B-B14F-4D97-AF65-F5344CB8AC3E}">
+        <p14:creationId xmlns:p14="http://schemas.microsoft.com/office/powerpoint/2010/main" val="741890155"/>
+      </p:ext>
+    </p:extLst>
+  </p:cSld>
+  <p:clrMapOvr>
+    <a:masterClrMapping/>
+  </p:clrMapOvr>
+</p:notes>
+</file>
+
+<file path=ppt/notesSlides/notesSlide12.xml><?xml version="1.0" encoding="utf-8"?>
+<p:notes xmlns:a="http://schemas.openxmlformats.org/drawingml/2006/main" xmlns:r="http://schemas.openxmlformats.org/officeDocument/2006/relationships" xmlns:p="http://schemas.openxmlformats.org/presentationml/2006/main">
+  <p:cSld>
+    <p:spTree>
+      <p:nvGrpSpPr>
+        <p:cNvPr id="1" name=""/>
+        <p:cNvGrpSpPr/>
+        <p:nvPr/>
+      </p:nvGrpSpPr>
+      <p:grpSpPr>
+        <a:xfrm>
+          <a:off x="0" y="0"/>
+          <a:ext cx="0" cy="0"/>
+          <a:chOff x="0" y="0"/>
+          <a:chExt cx="0" cy="0"/>
+        </a:xfrm>
+      </p:grpSpPr>
+      <p:sp>
+        <p:nvSpPr>
+          <p:cNvPr id="2" name="Tijdelijke aanduiding voor dia-afbeelding 1"/>
+          <p:cNvSpPr>
+            <a:spLocks noGrp="1" noRot="1" noChangeAspect="1"/>
+          </p:cNvSpPr>
+          <p:nvPr>
+            <p:ph type="sldImg"/>
+          </p:nvPr>
+        </p:nvSpPr>
+        <p:spPr/>
+      </p:sp>
+      <p:sp>
+        <p:nvSpPr>
+          <p:cNvPr id="3" name="Tijdelijke aanduiding voor notities 2"/>
+          <p:cNvSpPr>
+            <a:spLocks noGrp="1"/>
+          </p:cNvSpPr>
+          <p:nvPr>
+            <p:ph type="body" idx="1"/>
+          </p:nvPr>
+        </p:nvSpPr>
+        <p:spPr/>
+        <p:txBody>
+          <a:bodyPr/>
+          <a:lstStyle/>
+          <a:p>
+            <a:endParaRPr lang="nl-NL" dirty="0"/>
+          </a:p>
+        </p:txBody>
+      </p:sp>
+      <p:sp>
+        <p:nvSpPr>
+          <p:cNvPr id="4" name="Tijdelijke aanduiding voor dianummer 3"/>
+          <p:cNvSpPr>
+            <a:spLocks noGrp="1"/>
+          </p:cNvSpPr>
+          <p:nvPr>
+            <p:ph type="sldNum" sz="quarter" idx="10"/>
+          </p:nvPr>
+        </p:nvSpPr>
+        <p:spPr/>
+        <p:txBody>
+          <a:bodyPr/>
+          <a:lstStyle/>
+          <a:p>
+            <a:fld id="{261CDD63-AF9B-4BBE-BAEE-FE96D596103A}" type="slidenum">
+              <a:rPr lang="nl-NL" smtClean="0"/>
+              <a:t>12</a:t>
+            </a:fld>
+            <a:endParaRPr lang="nl-NL"/>
+          </a:p>
+        </p:txBody>
+      </p:sp>
+    </p:spTree>
+    <p:extLst>
+      <p:ext uri="{BB962C8B-B14F-4D97-AF65-F5344CB8AC3E}">
+        <p14:creationId xmlns:p14="http://schemas.microsoft.com/office/powerpoint/2010/main" val="3169262235"/>
+      </p:ext>
+    </p:extLst>
+  </p:cSld>
+  <p:clrMapOvr>
+    <a:masterClrMapping/>
+  </p:clrMapOvr>
+</p:notes>
+</file>
+
+<file path=ppt/notesSlides/notesSlide13.xml><?xml version="1.0" encoding="utf-8"?>
+<p:notes xmlns:a="http://schemas.openxmlformats.org/drawingml/2006/main" xmlns:r="http://schemas.openxmlformats.org/officeDocument/2006/relationships" xmlns:p="http://schemas.openxmlformats.org/presentationml/2006/main">
+  <p:cSld>
+    <p:spTree>
+      <p:nvGrpSpPr>
+        <p:cNvPr id="1" name=""/>
+        <p:cNvGrpSpPr/>
+        <p:nvPr/>
+      </p:nvGrpSpPr>
+      <p:grpSpPr>
+        <a:xfrm>
+          <a:off x="0" y="0"/>
+          <a:ext cx="0" cy="0"/>
+          <a:chOff x="0" y="0"/>
+          <a:chExt cx="0" cy="0"/>
+        </a:xfrm>
+      </p:grpSpPr>
+      <p:sp>
+        <p:nvSpPr>
+          <p:cNvPr id="2" name="Tijdelijke aanduiding voor dia-afbeelding 1"/>
+          <p:cNvSpPr>
+            <a:spLocks noGrp="1" noRot="1" noChangeAspect="1"/>
+          </p:cNvSpPr>
+          <p:nvPr>
+            <p:ph type="sldImg"/>
+          </p:nvPr>
+        </p:nvSpPr>
+        <p:spPr/>
+      </p:sp>
+      <p:sp>
+        <p:nvSpPr>
+          <p:cNvPr id="3" name="Tijdelijke aanduiding voor notities 2"/>
+          <p:cNvSpPr>
+            <a:spLocks noGrp="1"/>
+          </p:cNvSpPr>
+          <p:nvPr>
+            <p:ph type="body" idx="1"/>
+          </p:nvPr>
+        </p:nvSpPr>
+        <p:spPr/>
+        <p:txBody>
+          <a:bodyPr/>
+          <a:lstStyle/>
+          <a:p>
+            <a:endParaRPr lang="nl-NL" dirty="0"/>
+          </a:p>
+        </p:txBody>
+      </p:sp>
+      <p:sp>
+        <p:nvSpPr>
+          <p:cNvPr id="4" name="Tijdelijke aanduiding voor dianummer 3"/>
+          <p:cNvSpPr>
+            <a:spLocks noGrp="1"/>
+          </p:cNvSpPr>
+          <p:nvPr>
+            <p:ph type="sldNum" sz="quarter" idx="10"/>
+          </p:nvPr>
+        </p:nvSpPr>
+        <p:spPr/>
+        <p:txBody>
+          <a:bodyPr/>
+          <a:lstStyle/>
+          <a:p>
+            <a:fld id="{261CDD63-AF9B-4BBE-BAEE-FE96D596103A}" type="slidenum">
+              <a:rPr lang="nl-NL" smtClean="0"/>
+              <a:t>13</a:t>
             </a:fld>
             <a:endParaRPr lang="nl-NL"/>
           </a:p>
@@ -15168,10 +15338,300 @@
       </p:grpSpPr>
       <p:sp>
         <p:nvSpPr>
+          <p:cNvPr id="6" name="Tekstvak 5"/>
+          <p:cNvSpPr txBox="1"/>
+          <p:nvPr/>
+        </p:nvSpPr>
+        <p:spPr>
+          <a:xfrm>
+            <a:off x="2093473" y="1012173"/>
+            <a:ext cx="1032655" cy="369332"/>
+          </a:xfrm>
+          <a:prstGeom prst="rect">
+            <a:avLst/>
+          </a:prstGeom>
+          <a:noFill/>
+        </p:spPr>
+        <p:txBody>
+          <a:bodyPr wrap="none" rtlCol="0">
+            <a:spAutoFit/>
+          </a:bodyPr>
+          <a:lstStyle/>
+          <a:p>
+            <a:r>
+              <a:rPr lang="nl-NL" dirty="0" smtClean="0"/>
+              <a:t>Spanish</a:t>
+            </a:r>
+            <a:endParaRPr lang="nl-NL" dirty="0"/>
+          </a:p>
+        </p:txBody>
+      </p:sp>
+      <p:pic>
+        <p:nvPicPr>
+          <p:cNvPr id="2051" name="Picture 3" descr="C:\Users\Eyokiha\Dropbox\Documents\Courses\Master\Blok2\LearningFromData\Final\Spanish.png"/>
+          <p:cNvPicPr>
+            <a:picLocks noChangeAspect="1" noChangeArrowheads="1"/>
+          </p:cNvPicPr>
+          <p:nvPr/>
+        </p:nvPicPr>
+        <p:blipFill rotWithShape="1">
+          <a:blip r:embed="rId3">
+            <a:extLst>
+              <a:ext uri="{28A0092B-C50C-407E-A947-70E740481C1C}">
+                <a14:useLocalDpi xmlns:a14="http://schemas.microsoft.com/office/drawing/2010/main" val="0"/>
+              </a:ext>
+            </a:extLst>
+          </a:blip>
+          <a:srcRect r="40863" b="41483"/>
+          <a:stretch/>
+        </p:blipFill>
+        <p:spPr bwMode="auto">
+          <a:xfrm>
+            <a:off x="549746" y="1412776"/>
+            <a:ext cx="4120111" cy="4455204"/>
+          </a:xfrm>
+          <a:prstGeom prst="rect">
+            <a:avLst/>
+          </a:prstGeom>
+          <a:noFill/>
+          <a:extLst>
+            <a:ext uri="{909E8E84-426E-40DD-AFC4-6F175D3DCCD1}">
+              <a14:hiddenFill xmlns:a14="http://schemas.microsoft.com/office/drawing/2010/main">
+                <a:solidFill>
+                  <a:srgbClr val="FFFFFF"/>
+                </a:solidFill>
+              </a14:hiddenFill>
+            </a:ext>
+          </a:extLst>
+        </p:spPr>
+      </p:pic>
+      <p:pic>
+        <p:nvPicPr>
+          <p:cNvPr id="2052" name="Picture 4" descr="C:\Users\Eyokiha\Dropbox\Documents\Courses\Master\Blok2\LearningFromData\Final\Spanish.png"/>
+          <p:cNvPicPr>
+            <a:picLocks noChangeAspect="1" noChangeArrowheads="1"/>
+          </p:cNvPicPr>
+          <p:nvPr/>
+        </p:nvPicPr>
+        <p:blipFill rotWithShape="1">
+          <a:blip r:embed="rId3">
+            <a:extLst>
+              <a:ext uri="{28A0092B-C50C-407E-A947-70E740481C1C}">
+                <a14:useLocalDpi xmlns:a14="http://schemas.microsoft.com/office/drawing/2010/main" val="0"/>
+              </a:ext>
+            </a:extLst>
+          </a:blip>
+          <a:srcRect l="752" t="59245" r="42290" b="2732"/>
+          <a:stretch/>
+        </p:blipFill>
+        <p:spPr bwMode="auto">
+          <a:xfrm>
+            <a:off x="4720855" y="1418092"/>
+            <a:ext cx="3891109" cy="2838686"/>
+          </a:xfrm>
+          <a:prstGeom prst="rect">
+            <a:avLst/>
+          </a:prstGeom>
+          <a:noFill/>
+          <a:extLst>
+            <a:ext uri="{909E8E84-426E-40DD-AFC4-6F175D3DCCD1}">
+              <a14:hiddenFill xmlns:a14="http://schemas.microsoft.com/office/drawing/2010/main">
+                <a:solidFill>
+                  <a:srgbClr val="FFFFFF"/>
+                </a:solidFill>
+              </a14:hiddenFill>
+            </a:ext>
+          </a:extLst>
+        </p:spPr>
+      </p:pic>
+    </p:spTree>
+    <p:extLst>
+      <p:ext uri="{BB962C8B-B14F-4D97-AF65-F5344CB8AC3E}">
+        <p14:creationId xmlns:p14="http://schemas.microsoft.com/office/powerpoint/2010/main" val="4183911328"/>
+      </p:ext>
+    </p:extLst>
+  </p:cSld>
+  <p:clrMapOvr>
+    <a:masterClrMapping/>
+  </p:clrMapOvr>
+  <p:timing>
+    <p:tnLst>
+      <p:par>
+        <p:cTn id="1" dur="indefinite" restart="never" nodeType="tmRoot"/>
+      </p:par>
+    </p:tnLst>
+  </p:timing>
+</p:sld>
+</file>
+
+<file path=ppt/slides/slide11.xml><?xml version="1.0" encoding="utf-8"?>
+<p:sld xmlns:a="http://schemas.openxmlformats.org/drawingml/2006/main" xmlns:r="http://schemas.openxmlformats.org/officeDocument/2006/relationships" xmlns:p="http://schemas.openxmlformats.org/presentationml/2006/main">
+  <p:cSld>
+    <p:spTree>
+      <p:nvGrpSpPr>
+        <p:cNvPr id="1" name=""/>
+        <p:cNvGrpSpPr/>
+        <p:nvPr/>
+      </p:nvGrpSpPr>
+      <p:grpSpPr>
+        <a:xfrm>
+          <a:off x="0" y="0"/>
+          <a:ext cx="0" cy="0"/>
+          <a:chOff x="0" y="0"/>
+          <a:chExt cx="0" cy="0"/>
+        </a:xfrm>
+      </p:grpSpPr>
+      <p:sp>
+        <p:nvSpPr>
+          <p:cNvPr id="6" name="Tekstvak 5"/>
+          <p:cNvSpPr txBox="1"/>
+          <p:nvPr/>
+        </p:nvSpPr>
+        <p:spPr>
+          <a:xfrm>
+            <a:off x="2093473" y="1012173"/>
+            <a:ext cx="928459" cy="369332"/>
+          </a:xfrm>
+          <a:prstGeom prst="rect">
+            <a:avLst/>
+          </a:prstGeom>
+          <a:noFill/>
+        </p:spPr>
+        <p:txBody>
+          <a:bodyPr wrap="none" rtlCol="0">
+            <a:spAutoFit/>
+          </a:bodyPr>
+          <a:lstStyle/>
+          <a:p>
+            <a:r>
+              <a:rPr lang="nl-NL" dirty="0" smtClean="0"/>
+              <a:t>English</a:t>
+            </a:r>
+            <a:endParaRPr lang="nl-NL" dirty="0"/>
+          </a:p>
+        </p:txBody>
+      </p:sp>
+      <p:pic>
+        <p:nvPicPr>
+          <p:cNvPr id="3074" name="Picture 2" descr="C:\Users\Eyokiha\Dropbox\Documents\Courses\Master\Blok2\LearningFromData\Final\English.png"/>
+          <p:cNvPicPr>
+            <a:picLocks noChangeAspect="1" noChangeArrowheads="1"/>
+          </p:cNvPicPr>
+          <p:nvPr/>
+        </p:nvPicPr>
+        <p:blipFill rotWithShape="1">
+          <a:blip r:embed="rId3">
+            <a:extLst>
+              <a:ext uri="{28A0092B-C50C-407E-A947-70E740481C1C}">
+                <a14:useLocalDpi xmlns:a14="http://schemas.microsoft.com/office/drawing/2010/main" val="0"/>
+              </a:ext>
+            </a:extLst>
+          </a:blip>
+          <a:srcRect l="1024" t="-1" r="41443" b="43039"/>
+          <a:stretch/>
+        </p:blipFill>
+        <p:spPr bwMode="auto">
+          <a:xfrm>
+            <a:off x="539552" y="1381505"/>
+            <a:ext cx="4160039" cy="4599653"/>
+          </a:xfrm>
+          <a:prstGeom prst="rect">
+            <a:avLst/>
+          </a:prstGeom>
+          <a:noFill/>
+          <a:extLst>
+            <a:ext uri="{909E8E84-426E-40DD-AFC4-6F175D3DCCD1}">
+              <a14:hiddenFill xmlns:a14="http://schemas.microsoft.com/office/drawing/2010/main">
+                <a:solidFill>
+                  <a:srgbClr val="FFFFFF"/>
+                </a:solidFill>
+              </a14:hiddenFill>
+            </a:ext>
+          </a:extLst>
+        </p:spPr>
+      </p:pic>
+      <p:pic>
+        <p:nvPicPr>
+          <p:cNvPr id="3075" name="Picture 3" descr="C:\Users\Eyokiha\Dropbox\Documents\Courses\Master\Blok2\LearningFromData\Final\English.png"/>
+          <p:cNvPicPr>
+            <a:picLocks noChangeAspect="1" noChangeArrowheads="1"/>
+          </p:cNvPicPr>
+          <p:nvPr/>
+        </p:nvPicPr>
+        <p:blipFill rotWithShape="1">
+          <a:blip r:embed="rId3">
+            <a:extLst>
+              <a:ext uri="{28A0092B-C50C-407E-A947-70E740481C1C}">
+                <a14:useLocalDpi xmlns:a14="http://schemas.microsoft.com/office/drawing/2010/main" val="0"/>
+              </a:ext>
+            </a:extLst>
+          </a:blip>
+          <a:srcRect l="716" t="59113" r="41347" b="3383"/>
+          <a:stretch/>
+        </p:blipFill>
+        <p:spPr bwMode="auto">
+          <a:xfrm>
+            <a:off x="4743800" y="1381505"/>
+            <a:ext cx="3879492" cy="2804550"/>
+          </a:xfrm>
+          <a:prstGeom prst="rect">
+            <a:avLst/>
+          </a:prstGeom>
+          <a:noFill/>
+          <a:extLst>
+            <a:ext uri="{909E8E84-426E-40DD-AFC4-6F175D3DCCD1}">
+              <a14:hiddenFill xmlns:a14="http://schemas.microsoft.com/office/drawing/2010/main">
+                <a:solidFill>
+                  <a:srgbClr val="FFFFFF"/>
+                </a:solidFill>
+              </a14:hiddenFill>
+            </a:ext>
+          </a:extLst>
+        </p:spPr>
+      </p:pic>
+    </p:spTree>
+    <p:extLst>
+      <p:ext uri="{BB962C8B-B14F-4D97-AF65-F5344CB8AC3E}">
+        <p14:creationId xmlns:p14="http://schemas.microsoft.com/office/powerpoint/2010/main" val="1422344118"/>
+      </p:ext>
+    </p:extLst>
+  </p:cSld>
+  <p:clrMapOvr>
+    <a:masterClrMapping/>
+  </p:clrMapOvr>
+  <p:timing>
+    <p:tnLst>
+      <p:par>
+        <p:cTn id="1" dur="indefinite" restart="never" nodeType="tmRoot"/>
+      </p:par>
+    </p:tnLst>
+  </p:timing>
+</p:sld>
+</file>
+
+<file path=ppt/slides/slide12.xml><?xml version="1.0" encoding="utf-8"?>
+<p:sld xmlns:a="http://schemas.openxmlformats.org/drawingml/2006/main" xmlns:r="http://schemas.openxmlformats.org/officeDocument/2006/relationships" xmlns:p="http://schemas.openxmlformats.org/presentationml/2006/main">
+  <p:cSld>
+    <p:spTree>
+      <p:nvGrpSpPr>
+        <p:cNvPr id="1" name=""/>
+        <p:cNvGrpSpPr/>
+        <p:nvPr/>
+      </p:nvGrpSpPr>
+      <p:grpSpPr>
+        <a:xfrm>
+          <a:off x="0" y="0"/>
+          <a:ext cx="0" cy="0"/>
+          <a:chOff x="0" y="0"/>
+          <a:chExt cx="0" cy="0"/>
+        </a:xfrm>
+      </p:grpSpPr>
+      <p:sp>
+        <p:nvSpPr>
           <p:cNvPr id="2" name="Titel 1">
             <a:extLst>
               <a:ext uri="{FF2B5EF4-FFF2-40B4-BE49-F238E27FC236}">
-                <a16:creationId xmlns="" xmlns:a16="http://schemas.microsoft.com/office/drawing/2014/main" id="{3BD06130-7454-483B-82E8-3B325B7F5FA6}"/>
+                <a16:creationId xmlns:a16="http://schemas.microsoft.com/office/drawing/2014/main" xmlns="" id="{3BD06130-7454-483B-82E8-3B325B7F5FA6}"/>
               </a:ext>
             </a:extLst>
           </p:cNvPr>
@@ -15200,7 +15660,7 @@
           <p:cNvPr id="3" name="Tijdelijke aanduiding voor inhoud 2">
             <a:extLst>
               <a:ext uri="{FF2B5EF4-FFF2-40B4-BE49-F238E27FC236}">
-                <a16:creationId xmlns="" xmlns:a16="http://schemas.microsoft.com/office/drawing/2014/main" id="{16182D30-848C-4CA3-810D-C0E20F0E9986}"/>
+                <a16:creationId xmlns:a16="http://schemas.microsoft.com/office/drawing/2014/main" xmlns="" id="{16182D30-848C-4CA3-810D-C0E20F0E9986}"/>
               </a:ext>
             </a:extLst>
           </p:cNvPr>
@@ -15225,11 +15685,7 @@
           <a:p>
             <a:r>
               <a:rPr lang="nl-NL" sz="2200" dirty="0" smtClean="0"/>
-              <a:t>[NOG TOEVOEGEN</a:t>
-            </a:r>
-            <a:r>
-              <a:rPr lang="nl-NL" sz="2200" dirty="0" smtClean="0"/>
-              <a:t>]</a:t>
+              <a:t>[NOG TOEVOEGEN]</a:t>
             </a:r>
           </a:p>
           <a:p>
@@ -15269,11 +15725,7 @@
             </a:r>
             <a:r>
               <a:rPr lang="nl-NL" sz="2200" dirty="0" err="1" smtClean="0"/>
-              <a:t>O</a:t>
-            </a:r>
-            <a:r>
-              <a:rPr lang="nl-NL" sz="2200" dirty="0" err="1" smtClean="0"/>
-              <a:t>ptimization</a:t>
+              <a:t>Optimization</a:t>
             </a:r>
             <a:r>
               <a:rPr lang="nl-NL" sz="2200" dirty="0" smtClean="0"/>
@@ -15325,7 +15777,6 @@
               <a:rPr lang="nl-NL" sz="2200" dirty="0" smtClean="0"/>
               <a:t> on different genres</a:t>
             </a:r>
-            <a:endParaRPr lang="nl-NL" sz="2200" dirty="0" smtClean="0"/>
           </a:p>
         </p:txBody>
       </p:sp>
@@ -15349,7 +15800,7 @@
 </p:sld>
 </file>
 
-<file path=ppt/slides/slide11.xml><?xml version="1.0" encoding="utf-8"?>
+<file path=ppt/slides/slide13.xml><?xml version="1.0" encoding="utf-8"?>
 <p:sld xmlns:a="http://schemas.openxmlformats.org/drawingml/2006/main" xmlns:r="http://schemas.openxmlformats.org/officeDocument/2006/relationships" xmlns:p="http://schemas.openxmlformats.org/presentationml/2006/main">
   <p:cSld>
     <p:spTree>
@@ -15933,7 +16384,7 @@
           <p:cNvPr id="2" name="Titel 1">
             <a:extLst>
               <a:ext uri="{FF2B5EF4-FFF2-40B4-BE49-F238E27FC236}">
-                <a16:creationId xmlns="" xmlns:a16="http://schemas.microsoft.com/office/drawing/2014/main" id="{3BD06130-7454-483B-82E8-3B325B7F5FA6}"/>
+                <a16:creationId xmlns:a16="http://schemas.microsoft.com/office/drawing/2014/main" xmlns="" id="{3BD06130-7454-483B-82E8-3B325B7F5FA6}"/>
               </a:ext>
             </a:extLst>
           </p:cNvPr>
@@ -15962,7 +16413,7 @@
           <p:cNvPr id="3" name="Tijdelijke aanduiding voor inhoud 2">
             <a:extLst>
               <a:ext uri="{FF2B5EF4-FFF2-40B4-BE49-F238E27FC236}">
-                <a16:creationId xmlns="" xmlns:a16="http://schemas.microsoft.com/office/drawing/2014/main" id="{16182D30-848C-4CA3-810D-C0E20F0E9986}"/>
+                <a16:creationId xmlns:a16="http://schemas.microsoft.com/office/drawing/2014/main" xmlns="" id="{16182D30-848C-4CA3-810D-C0E20F0E9986}"/>
               </a:ext>
             </a:extLst>
           </p:cNvPr>
@@ -16087,7 +16538,7 @@
           <p:cNvPr id="2" name="Titel 1">
             <a:extLst>
               <a:ext uri="{FF2B5EF4-FFF2-40B4-BE49-F238E27FC236}">
-                <a16:creationId xmlns="" xmlns:a16="http://schemas.microsoft.com/office/drawing/2014/main" id="{3BD06130-7454-483B-82E8-3B325B7F5FA6}"/>
+                <a16:creationId xmlns:a16="http://schemas.microsoft.com/office/drawing/2014/main" xmlns="" id="{3BD06130-7454-483B-82E8-3B325B7F5FA6}"/>
               </a:ext>
             </a:extLst>
           </p:cNvPr>
@@ -16116,7 +16567,7 @@
           <p:cNvPr id="3" name="Tijdelijke aanduiding voor inhoud 2">
             <a:extLst>
               <a:ext uri="{FF2B5EF4-FFF2-40B4-BE49-F238E27FC236}">
-                <a16:creationId xmlns="" xmlns:a16="http://schemas.microsoft.com/office/drawing/2014/main" id="{16182D30-848C-4CA3-810D-C0E20F0E9986}"/>
+                <a16:creationId xmlns:a16="http://schemas.microsoft.com/office/drawing/2014/main" xmlns="" id="{16182D30-848C-4CA3-810D-C0E20F0E9986}"/>
               </a:ext>
             </a:extLst>
           </p:cNvPr>
@@ -16204,7 +16655,7 @@
           <p:cNvPr id="4" name="Tijdelijke aanduiding voor inhoud 2">
             <a:extLst>
               <a:ext uri="{FF2B5EF4-FFF2-40B4-BE49-F238E27FC236}">
-                <a16:creationId xmlns="" xmlns:a16="http://schemas.microsoft.com/office/drawing/2014/main" id="{16182D30-848C-4CA3-810D-C0E20F0E9986}"/>
+                <a16:creationId xmlns:a16="http://schemas.microsoft.com/office/drawing/2014/main" xmlns="" id="{16182D30-848C-4CA3-810D-C0E20F0E9986}"/>
               </a:ext>
             </a:extLst>
           </p:cNvPr>
@@ -16764,32 +17215,9 @@
           <a:chExt cx="0" cy="0"/>
         </a:xfrm>
       </p:grpSpPr>
-      <p:sp>
-        <p:nvSpPr>
-          <p:cNvPr id="2" name="Titel 1"/>
-          <p:cNvSpPr>
-            <a:spLocks noGrp="1"/>
-          </p:cNvSpPr>
-          <p:nvPr>
-            <p:ph type="title"/>
-          </p:nvPr>
-        </p:nvSpPr>
-        <p:spPr/>
-        <p:txBody>
-          <a:bodyPr/>
-          <a:lstStyle/>
-          <a:p>
-            <a:r>
-              <a:rPr lang="nl-NL" dirty="0" err="1" smtClean="0"/>
-              <a:t>Results</a:t>
-            </a:r>
-            <a:endParaRPr lang="nl-NL" dirty="0"/>
-          </a:p>
-        </p:txBody>
-      </p:sp>
       <p:pic>
         <p:nvPicPr>
-          <p:cNvPr id="2050" name="Picture 2"/>
+          <p:cNvPr id="1026" name="Picture 2" descr="C:\Users\Eyokiha\Dropbox\Documents\Courses\Master\Blok2\LearningFromData\Final\Dutch.png"/>
           <p:cNvPicPr>
             <a:picLocks noChangeAspect="1" noChangeArrowheads="1"/>
           </p:cNvPicPr>
@@ -16798,66 +17226,83 @@
         <p:blipFill rotWithShape="1">
           <a:blip r:embed="rId3">
             <a:extLst>
-              <a:ext uri="{BEBA8EAE-BF5A-486C-A8C5-ECC9F3942E4B}">
-                <a14:imgProps xmlns:a14="http://schemas.microsoft.com/office/drawing/2010/main">
-                  <a14:imgLayer r:embed="rId4">
-                    <a14:imgEffect>
-                      <a14:sharpenSoften amount="-50000"/>
-                    </a14:imgEffect>
-                  </a14:imgLayer>
-                </a14:imgProps>
-              </a:ext>
               <a:ext uri="{28A0092B-C50C-407E-A947-70E740481C1C}">
                 <a14:useLocalDpi xmlns:a14="http://schemas.microsoft.com/office/drawing/2010/main" val="0"/>
               </a:ext>
             </a:extLst>
           </a:blip>
-          <a:srcRect l="49832" b="10714"/>
+          <a:srcRect l="900" r="42213" b="10497"/>
           <a:stretch/>
         </p:blipFill>
         <p:spPr bwMode="auto">
           <a:xfrm>
-            <a:off x="2411760" y="2110963"/>
-            <a:ext cx="3960440" cy="4087817"/>
+            <a:off x="2354209" y="1159000"/>
+            <a:ext cx="4003533" cy="1888984"/>
           </a:xfrm>
           <a:prstGeom prst="rect">
             <a:avLst/>
           </a:prstGeom>
           <a:noFill/>
-          <a:ln>
-            <a:noFill/>
-          </a:ln>
           <a:extLst>
             <a:ext uri="{909E8E84-426E-40DD-AFC4-6F175D3DCCD1}">
               <a14:hiddenFill xmlns:a14="http://schemas.microsoft.com/office/drawing/2010/main">
                 <a:solidFill>
-                  <a:schemeClr val="accent1"/>
+                  <a:srgbClr val="FFFFFF"/>
                 </a:solidFill>
               </a14:hiddenFill>
             </a:ext>
-            <a:ext uri="{91240B29-F687-4F45-9708-019B960494DF}">
-              <a14:hiddenLine xmlns:a14="http://schemas.microsoft.com/office/drawing/2010/main" w="9525">
+          </a:extLst>
+        </p:spPr>
+      </p:pic>
+      <p:pic>
+        <p:nvPicPr>
+          <p:cNvPr id="1027" name="Picture 3" descr="C:\Users\Eyokiha\Dropbox\Documents\Courses\Master\Blok2\LearningFromData\Final\Italian.png"/>
+          <p:cNvPicPr>
+            <a:picLocks noChangeAspect="1" noChangeArrowheads="1"/>
+          </p:cNvPicPr>
+          <p:nvPr/>
+        </p:nvPicPr>
+        <p:blipFill rotWithShape="1">
+          <a:blip r:embed="rId4">
+            <a:extLst>
+              <a:ext uri="{28A0092B-C50C-407E-A947-70E740481C1C}">
+                <a14:useLocalDpi xmlns:a14="http://schemas.microsoft.com/office/drawing/2010/main" val="0"/>
+              </a:ext>
+            </a:extLst>
+          </a:blip>
+          <a:srcRect l="985" r="41214" b="11446"/>
+          <a:stretch/>
+        </p:blipFill>
+        <p:spPr bwMode="auto">
+          <a:xfrm>
+            <a:off x="2267744" y="3546948"/>
+            <a:ext cx="4111428" cy="1888984"/>
+          </a:xfrm>
+          <a:prstGeom prst="rect">
+            <a:avLst/>
+          </a:prstGeom>
+          <a:noFill/>
+          <a:extLst>
+            <a:ext uri="{909E8E84-426E-40DD-AFC4-6F175D3DCCD1}">
+              <a14:hiddenFill xmlns:a14="http://schemas.microsoft.com/office/drawing/2010/main">
                 <a:solidFill>
-                  <a:schemeClr val="tx1"/>
+                  <a:srgbClr val="FFFFFF"/>
                 </a:solidFill>
-                <a:miter lim="800000"/>
-                <a:headEnd/>
-                <a:tailEnd/>
-              </a14:hiddenLine>
+              </a14:hiddenFill>
             </a:ext>
           </a:extLst>
         </p:spPr>
       </p:pic>
       <p:sp>
         <p:nvSpPr>
-          <p:cNvPr id="3" name="Tekstvak 2"/>
+          <p:cNvPr id="5" name="Tekstvak 4"/>
           <p:cNvSpPr txBox="1"/>
           <p:nvPr/>
         </p:nvSpPr>
         <p:spPr>
           <a:xfrm>
-            <a:off x="2411760" y="6198781"/>
-            <a:ext cx="3888432" cy="276999"/>
+            <a:off x="3923004" y="3047984"/>
+            <a:ext cx="865943" cy="369332"/>
           </a:xfrm>
           <a:prstGeom prst="rect">
             <a:avLst/>
@@ -16865,21 +17310,46 @@
           <a:noFill/>
         </p:spPr>
         <p:txBody>
-          <a:bodyPr wrap="square" rtlCol="0">
+          <a:bodyPr wrap="none" rtlCol="0">
             <a:spAutoFit/>
           </a:bodyPr>
           <a:lstStyle/>
           <a:p>
-            <a:pPr algn="ctr"/>
             <a:r>
-              <a:rPr lang="nl-NL" sz="1200" b="1" dirty="0" err="1" smtClean="0"/>
-              <a:t>Results</a:t>
+              <a:rPr lang="nl-NL" dirty="0" smtClean="0"/>
+              <a:t>Dutch</a:t>
             </a:r>
+            <a:endParaRPr lang="nl-NL" dirty="0"/>
+          </a:p>
+        </p:txBody>
+      </p:sp>
+      <p:sp>
+        <p:nvSpPr>
+          <p:cNvPr id="6" name="Tekstvak 5"/>
+          <p:cNvSpPr txBox="1"/>
+          <p:nvPr/>
+        </p:nvSpPr>
+        <p:spPr>
+          <a:xfrm>
+            <a:off x="3891288" y="5435932"/>
+            <a:ext cx="864339" cy="369332"/>
+          </a:xfrm>
+          <a:prstGeom prst="rect">
+            <a:avLst/>
+          </a:prstGeom>
+          <a:noFill/>
+        </p:spPr>
+        <p:txBody>
+          <a:bodyPr wrap="none" rtlCol="0">
+            <a:spAutoFit/>
+          </a:bodyPr>
+          <a:lstStyle/>
+          <a:p>
             <a:r>
-              <a:rPr lang="nl-NL" sz="1200" b="1" dirty="0" smtClean="0"/>
-              <a:t> test set</a:t>
+              <a:rPr lang="nl-NL" dirty="0" err="1" smtClean="0"/>
+              <a:t>Italian</a:t>
             </a:r>
-            <a:endParaRPr lang="nl-NL" sz="1200" b="1" dirty="0"/>
+            <a:endParaRPr lang="nl-NL" dirty="0"/>
           </a:p>
         </p:txBody>
       </p:sp>

</xml_diff>

<commit_message>
added background and conclusion
</commit_message>
<xml_diff>
--- a/Presentation.pptx
+++ b/Presentation.pptx
@@ -19098,26 +19098,137 @@
           <a:p>
             <a:r>
               <a:rPr lang="nl-NL" sz="2200" dirty="0"/>
-              <a:t>[NOG TOEVOEGEN]</a:t>
-            </a:r>
-          </a:p>
-          <a:p>
-            <a:endParaRPr lang="nl-NL" sz="2200" dirty="0"/>
-          </a:p>
-          <a:p>
-            <a:endParaRPr lang="nl-NL" sz="2200" dirty="0"/>
-          </a:p>
-          <a:p>
-            <a:endParaRPr lang="nl-NL" sz="2200" dirty="0"/>
-          </a:p>
-          <a:p>
-            <a:endParaRPr lang="nl-NL" sz="2200" dirty="0"/>
-          </a:p>
-          <a:p>
-            <a:endParaRPr lang="nl-NL" sz="2200" dirty="0"/>
-          </a:p>
-          <a:p>
-            <a:endParaRPr lang="nl-NL" sz="2200" dirty="0"/>
+              <a:t>F1-scores </a:t>
+            </a:r>
+            <a:r>
+              <a:rPr lang="nl-NL" sz="2200" dirty="0" err="1"/>
+              <a:t>outperform</a:t>
+            </a:r>
+            <a:r>
+              <a:rPr lang="nl-NL" sz="2200" dirty="0"/>
+              <a:t> baseline system</a:t>
+            </a:r>
+          </a:p>
+          <a:p>
+            <a:r>
+              <a:rPr lang="nl-NL" sz="2200" dirty="0"/>
+              <a:t>Scores on test data </a:t>
+            </a:r>
+            <a:r>
+              <a:rPr lang="nl-NL" sz="2200" dirty="0" err="1"/>
+              <a:t>higher</a:t>
+            </a:r>
+            <a:r>
+              <a:rPr lang="nl-NL" sz="2200" dirty="0"/>
+              <a:t> </a:t>
+            </a:r>
+            <a:r>
+              <a:rPr lang="nl-NL" sz="2200" dirty="0" err="1"/>
+              <a:t>than</a:t>
+            </a:r>
+            <a:r>
+              <a:rPr lang="nl-NL" sz="2200" dirty="0"/>
+              <a:t> on development set</a:t>
+            </a:r>
+          </a:p>
+          <a:p>
+            <a:pPr lvl="1"/>
+            <a:r>
+              <a:rPr lang="nl-NL" sz="2000" dirty="0" err="1"/>
+              <a:t>Due</a:t>
+            </a:r>
+            <a:r>
+              <a:rPr lang="nl-NL" sz="2000" dirty="0"/>
+              <a:t> </a:t>
+            </a:r>
+            <a:r>
+              <a:rPr lang="nl-NL" sz="2000" dirty="0" err="1"/>
+              <a:t>to</a:t>
+            </a:r>
+            <a:r>
+              <a:rPr lang="nl-NL" sz="2000" dirty="0"/>
+              <a:t> K-</a:t>
+            </a:r>
+            <a:r>
+              <a:rPr lang="nl-NL" sz="2000" dirty="0" err="1"/>
+              <a:t>fold</a:t>
+            </a:r>
+            <a:r>
+              <a:rPr lang="nl-NL" sz="2000" dirty="0"/>
+              <a:t> CV </a:t>
+            </a:r>
+            <a:r>
+              <a:rPr lang="nl-NL" sz="2000" dirty="0" err="1"/>
+              <a:t>with</a:t>
+            </a:r>
+            <a:r>
+              <a:rPr lang="nl-NL" sz="2000" dirty="0"/>
+              <a:t> few samples per </a:t>
+            </a:r>
+            <a:r>
+              <a:rPr lang="nl-NL" sz="2000" dirty="0" err="1"/>
+              <a:t>fold</a:t>
+            </a:r>
+            <a:endParaRPr lang="nl-NL" sz="2000" dirty="0"/>
+          </a:p>
+          <a:p>
+            <a:pPr lvl="1"/>
+            <a:r>
+              <a:rPr lang="nl-NL" sz="2000" dirty="0" err="1"/>
+              <a:t>Suggests</a:t>
+            </a:r>
+            <a:r>
+              <a:rPr lang="nl-NL" sz="2000" dirty="0"/>
+              <a:t> </a:t>
+            </a:r>
+            <a:r>
+              <a:rPr lang="nl-NL" sz="2000" dirty="0" err="1"/>
+              <a:t>that</a:t>
+            </a:r>
+            <a:r>
+              <a:rPr lang="nl-NL" sz="2000" dirty="0"/>
+              <a:t> </a:t>
+            </a:r>
+            <a:r>
+              <a:rPr lang="nl-NL" sz="2000" dirty="0" err="1"/>
+              <a:t>for</a:t>
+            </a:r>
+            <a:r>
+              <a:rPr lang="nl-NL" sz="2000" dirty="0"/>
+              <a:t> </a:t>
+            </a:r>
+            <a:r>
+              <a:rPr lang="nl-NL" sz="2000" dirty="0" err="1"/>
+              <a:t>age</a:t>
+            </a:r>
+            <a:r>
+              <a:rPr lang="nl-NL" sz="2000" dirty="0"/>
+              <a:t> </a:t>
+            </a:r>
+            <a:r>
+              <a:rPr lang="nl-NL" sz="2000" dirty="0" err="1"/>
+              <a:t>and</a:t>
+            </a:r>
+            <a:r>
+              <a:rPr lang="nl-NL" sz="2000" dirty="0"/>
+              <a:t> gender </a:t>
+            </a:r>
+            <a:r>
+              <a:rPr lang="nl-NL" sz="2000" dirty="0" err="1"/>
+              <a:t>prediction</a:t>
+            </a:r>
+            <a:r>
+              <a:rPr lang="nl-NL" sz="2000" dirty="0"/>
+              <a:t>, corpus </a:t>
+            </a:r>
+            <a:r>
+              <a:rPr lang="nl-NL" sz="2000" dirty="0" err="1"/>
+              <a:t>size</a:t>
+            </a:r>
+            <a:r>
+              <a:rPr lang="nl-NL" sz="2000" dirty="0"/>
+              <a:t> is important</a:t>
+            </a:r>
           </a:p>
           <a:p>
             <a:r>
@@ -19136,50 +19247,51 @@
               <a:rPr lang="nl-NL" sz="2200" dirty="0"/>
               <a:t>: 	</a:t>
             </a:r>
-            <a:r>
-              <a:rPr lang="nl-NL" sz="2200" dirty="0" err="1"/>
+          </a:p>
+          <a:p>
+            <a:pPr lvl="1"/>
+            <a:r>
+              <a:rPr lang="nl-NL" sz="2000" dirty="0" err="1"/>
               <a:t>Optimization</a:t>
             </a:r>
             <a:r>
-              <a:rPr lang="nl-NL" sz="2200" dirty="0"/>
+              <a:rPr lang="nl-NL" sz="2000" dirty="0"/>
               <a:t> per </a:t>
             </a:r>
             <a:r>
-              <a:rPr lang="nl-NL" sz="2200" dirty="0" err="1"/>
+              <a:rPr lang="nl-NL" sz="2000" dirty="0" err="1"/>
               <a:t>language</a:t>
             </a:r>
-            <a:br>
-              <a:rPr lang="nl-NL" sz="2200" dirty="0"/>
-            </a:br>
-            <a:r>
-              <a:rPr lang="nl-NL" sz="2200" dirty="0"/>
-              <a:t>		    	Advanced </a:t>
-            </a:r>
-            <a:r>
-              <a:rPr lang="nl-NL" sz="2200" dirty="0" err="1"/>
+            <a:endParaRPr lang="nl-NL" sz="2000" dirty="0"/>
+          </a:p>
+          <a:p>
+            <a:pPr lvl="1"/>
+            <a:r>
+              <a:rPr lang="nl-NL" sz="2000" dirty="0"/>
+              <a:t>Advanced </a:t>
+            </a:r>
+            <a:r>
+              <a:rPr lang="nl-NL" sz="2000" dirty="0" err="1"/>
               <a:t>neural</a:t>
             </a:r>
             <a:r>
-              <a:rPr lang="nl-NL" sz="2200" dirty="0"/>
+              <a:rPr lang="nl-NL" sz="2000" dirty="0"/>
               <a:t> </a:t>
             </a:r>
             <a:r>
-              <a:rPr lang="nl-NL" sz="2200" dirty="0" err="1"/>
+              <a:rPr lang="nl-NL" sz="2000" dirty="0" err="1"/>
               <a:t>networks</a:t>
             </a:r>
-            <a:br>
-              <a:rPr lang="nl-NL" sz="2200" dirty="0"/>
-            </a:br>
-            <a:r>
-              <a:rPr lang="nl-NL" sz="2200" dirty="0"/>
-              <a:t>			</a:t>
-            </a:r>
-            <a:r>
-              <a:rPr lang="nl-NL" sz="2200" dirty="0" err="1"/>
+            <a:endParaRPr lang="nl-NL" sz="2000" dirty="0"/>
+          </a:p>
+          <a:p>
+            <a:pPr lvl="1"/>
+            <a:r>
+              <a:rPr lang="nl-NL" sz="2000" dirty="0" err="1"/>
               <a:t>Testing</a:t>
             </a:r>
             <a:r>
-              <a:rPr lang="nl-NL" sz="2200" dirty="0"/>
+              <a:rPr lang="nl-NL" sz="2000" dirty="0"/>
               <a:t> on different genres</a:t>
             </a:r>
           </a:p>
@@ -19408,7 +19520,152 @@
           <a:p>
             <a:r>
               <a:rPr lang="nl-NL" dirty="0"/>
-              <a:t>[NOG TOEVOEGEN]</a:t>
+              <a:t>PAN Shared </a:t>
+            </a:r>
+            <a:r>
+              <a:rPr lang="nl-NL" dirty="0" err="1"/>
+              <a:t>Task</a:t>
+            </a:r>
+            <a:r>
+              <a:rPr lang="nl-NL" dirty="0"/>
+              <a:t> Author </a:t>
+            </a:r>
+            <a:r>
+              <a:rPr lang="nl-NL" dirty="0" err="1"/>
+              <a:t>Profiling</a:t>
+            </a:r>
+            <a:r>
+              <a:rPr lang="nl-NL" dirty="0"/>
+              <a:t> 2017 (</a:t>
+            </a:r>
+            <a:r>
+              <a:rPr lang="nl-NL" dirty="0" err="1"/>
+              <a:t>Rangel</a:t>
+            </a:r>
+            <a:r>
+              <a:rPr lang="nl-NL" dirty="0"/>
+              <a:t> et al., 2017)</a:t>
+            </a:r>
+          </a:p>
+          <a:p>
+            <a:pPr lvl="1"/>
+            <a:r>
+              <a:rPr lang="nl-NL" dirty="0"/>
+              <a:t>Gender </a:t>
+            </a:r>
+            <a:r>
+              <a:rPr lang="nl-NL" dirty="0" err="1"/>
+              <a:t>and</a:t>
+            </a:r>
+            <a:r>
+              <a:rPr lang="nl-NL" dirty="0"/>
+              <a:t> </a:t>
+            </a:r>
+            <a:r>
+              <a:rPr lang="nl-NL" dirty="0" err="1"/>
+              <a:t>language</a:t>
+            </a:r>
+            <a:r>
+              <a:rPr lang="nl-NL" dirty="0"/>
+              <a:t> </a:t>
+            </a:r>
+            <a:r>
+              <a:rPr lang="nl-NL" dirty="0" err="1"/>
+              <a:t>variety</a:t>
+            </a:r>
+            <a:endParaRPr lang="nl-NL" dirty="0"/>
+          </a:p>
+          <a:p>
+            <a:pPr lvl="1"/>
+            <a:r>
+              <a:rPr lang="nl-NL" dirty="0" err="1"/>
+              <a:t>SVMs</a:t>
+            </a:r>
+            <a:r>
+              <a:rPr lang="nl-NL" dirty="0"/>
+              <a:t> </a:t>
+            </a:r>
+            <a:r>
+              <a:rPr lang="nl-NL" dirty="0" err="1"/>
+              <a:t>with</a:t>
+            </a:r>
+            <a:r>
+              <a:rPr lang="nl-NL" dirty="0"/>
+              <a:t> </a:t>
+            </a:r>
+            <a:r>
+              <a:rPr lang="nl-NL" dirty="0" err="1"/>
+              <a:t>char</a:t>
+            </a:r>
+            <a:r>
+              <a:rPr lang="nl-NL" dirty="0"/>
+              <a:t> </a:t>
+            </a:r>
+            <a:r>
+              <a:rPr lang="nl-NL" dirty="0" err="1"/>
+              <a:t>ngrams</a:t>
+            </a:r>
+            <a:r>
+              <a:rPr lang="nl-NL" dirty="0"/>
+              <a:t> </a:t>
+            </a:r>
+            <a:r>
+              <a:rPr lang="nl-NL" dirty="0" err="1"/>
+              <a:t>tf-idf</a:t>
+            </a:r>
+            <a:r>
+              <a:rPr lang="nl-NL" dirty="0"/>
+              <a:t> word </a:t>
+            </a:r>
+            <a:r>
+              <a:rPr lang="nl-NL" dirty="0" err="1"/>
+              <a:t>ngrams</a:t>
+            </a:r>
+            <a:endParaRPr lang="nl-NL" dirty="0"/>
+          </a:p>
+          <a:p>
+            <a:r>
+              <a:rPr lang="nl-NL" dirty="0"/>
+              <a:t>Nguyen et al. (2011)</a:t>
+            </a:r>
+          </a:p>
+          <a:p>
+            <a:pPr lvl="1"/>
+            <a:r>
+              <a:rPr lang="nl-NL" dirty="0"/>
+              <a:t>Author </a:t>
+            </a:r>
+            <a:r>
+              <a:rPr lang="nl-NL" dirty="0" err="1"/>
+              <a:t>age</a:t>
+            </a:r>
+            <a:r>
+              <a:rPr lang="nl-NL" dirty="0"/>
+              <a:t> </a:t>
+            </a:r>
+            <a:r>
+              <a:rPr lang="nl-NL" dirty="0" err="1"/>
+              <a:t>prediction</a:t>
+            </a:r>
+            <a:endParaRPr lang="nl-NL" dirty="0"/>
+          </a:p>
+          <a:p>
+            <a:pPr lvl="1"/>
+            <a:r>
+              <a:rPr lang="nl-NL" dirty="0" err="1"/>
+              <a:t>Stylistic</a:t>
+            </a:r>
+            <a:r>
+              <a:rPr lang="nl-NL" dirty="0"/>
+              <a:t> </a:t>
+            </a:r>
+            <a:r>
+              <a:rPr lang="nl-NL" dirty="0" err="1"/>
+              <a:t>and</a:t>
+            </a:r>
+            <a:r>
+              <a:rPr lang="nl-NL" dirty="0"/>
+              <a:t> content features</a:t>
             </a:r>
           </a:p>
         </p:txBody>

</xml_diff>